<commit_message>
Apresentação II quase finalizada
</commit_message>
<xml_diff>
--- a/avc-images/apresentação II.pptx
+++ b/avc-images/apresentação II.pptx
@@ -15,13 +15,14 @@
     <p:sldId id="268" r:id="rId9"/>
     <p:sldId id="274" r:id="rId10"/>
     <p:sldId id="265" r:id="rId11"/>
-    <p:sldId id="275" r:id="rId12"/>
+    <p:sldId id="276" r:id="rId12"/>
     <p:sldId id="262" r:id="rId13"/>
-    <p:sldId id="263" r:id="rId14"/>
-    <p:sldId id="264" r:id="rId15"/>
-    <p:sldId id="270" r:id="rId16"/>
-    <p:sldId id="271" r:id="rId17"/>
-    <p:sldId id="272" r:id="rId18"/>
+    <p:sldId id="279" r:id="rId14"/>
+    <p:sldId id="278" r:id="rId15"/>
+    <p:sldId id="264" r:id="rId16"/>
+    <p:sldId id="270" r:id="rId17"/>
+    <p:sldId id="271" r:id="rId18"/>
+    <p:sldId id="272" r:id="rId19"/>
   </p:sldIdLst>
   <p:sldSz cx="12192000" cy="6858000"/>
   <p:notesSz cx="6858000" cy="9144000"/>
@@ -290,7 +291,7 @@
           <a:p>
             <a:fld id="{A13F4FCF-11A6-4574-B39A-7F4B241CA0C1}" type="datetimeFigureOut">
               <a:rPr lang="pt-BR" smtClean="0"/>
-              <a:t>12/10/2022</a:t>
+              <a:t>13/10/2022</a:t>
             </a:fld>
             <a:endParaRPr lang="pt-BR"/>
           </a:p>
@@ -488,7 +489,7 @@
           <a:p>
             <a:fld id="{A13F4FCF-11A6-4574-B39A-7F4B241CA0C1}" type="datetimeFigureOut">
               <a:rPr lang="pt-BR" smtClean="0"/>
-              <a:t>12/10/2022</a:t>
+              <a:t>13/10/2022</a:t>
             </a:fld>
             <a:endParaRPr lang="pt-BR"/>
           </a:p>
@@ -696,7 +697,7 @@
           <a:p>
             <a:fld id="{A13F4FCF-11A6-4574-B39A-7F4B241CA0C1}" type="datetimeFigureOut">
               <a:rPr lang="pt-BR" smtClean="0"/>
-              <a:t>12/10/2022</a:t>
+              <a:t>13/10/2022</a:t>
             </a:fld>
             <a:endParaRPr lang="pt-BR"/>
           </a:p>
@@ -1439,7 +1440,7 @@
           <a:p>
             <a:fld id="{A13F4FCF-11A6-4574-B39A-7F4B241CA0C1}" type="datetimeFigureOut">
               <a:rPr lang="pt-BR" smtClean="0"/>
-              <a:t>12/10/2022</a:t>
+              <a:t>13/10/2022</a:t>
             </a:fld>
             <a:endParaRPr lang="pt-BR"/>
           </a:p>
@@ -1861,7 +1862,7 @@
           <a:p>
             <a:fld id="{A13F4FCF-11A6-4574-B39A-7F4B241CA0C1}" type="datetimeFigureOut">
               <a:rPr lang="pt-BR" smtClean="0"/>
-              <a:t>12/10/2022</a:t>
+              <a:t>13/10/2022</a:t>
             </a:fld>
             <a:endParaRPr lang="pt-BR"/>
           </a:p>
@@ -2002,7 +2003,7 @@
           <a:p>
             <a:fld id="{A13F4FCF-11A6-4574-B39A-7F4B241CA0C1}" type="datetimeFigureOut">
               <a:rPr lang="pt-BR" smtClean="0"/>
-              <a:t>12/10/2022</a:t>
+              <a:t>13/10/2022</a:t>
             </a:fld>
             <a:endParaRPr lang="pt-BR"/>
           </a:p>
@@ -2115,7 +2116,7 @@
           <a:p>
             <a:fld id="{A13F4FCF-11A6-4574-B39A-7F4B241CA0C1}" type="datetimeFigureOut">
               <a:rPr lang="pt-BR" smtClean="0"/>
-              <a:t>12/10/2022</a:t>
+              <a:t>13/10/2022</a:t>
             </a:fld>
             <a:endParaRPr lang="pt-BR"/>
           </a:p>
@@ -2426,7 +2427,7 @@
           <a:p>
             <a:fld id="{A13F4FCF-11A6-4574-B39A-7F4B241CA0C1}" type="datetimeFigureOut">
               <a:rPr lang="pt-BR" smtClean="0"/>
-              <a:t>12/10/2022</a:t>
+              <a:t>13/10/2022</a:t>
             </a:fld>
             <a:endParaRPr lang="pt-BR"/>
           </a:p>
@@ -2714,7 +2715,7 @@
           <a:p>
             <a:fld id="{A13F4FCF-11A6-4574-B39A-7F4B241CA0C1}" type="datetimeFigureOut">
               <a:rPr lang="pt-BR" smtClean="0"/>
-              <a:t>12/10/2022</a:t>
+              <a:t>13/10/2022</a:t>
             </a:fld>
             <a:endParaRPr lang="pt-BR"/>
           </a:p>
@@ -2955,7 +2956,7 @@
           <a:p>
             <a:fld id="{A13F4FCF-11A6-4574-B39A-7F4B241CA0C1}" type="datetimeFigureOut">
               <a:rPr lang="pt-BR" smtClean="0"/>
-              <a:t>12/10/2022</a:t>
+              <a:t>13/10/2022</a:t>
             </a:fld>
             <a:endParaRPr lang="pt-BR"/>
           </a:p>
@@ -3534,20 +3535,16 @@
           </a:bodyPr>
           <a:lstStyle/>
           <a:p>
+            <a:pPr marL="0" indent="0">
+              <a:buNone/>
+            </a:pPr>
             <a:r>
               <a:rPr lang="pt-BR" dirty="0"/>
-              <a:t>É uma Rede Neural Convolucional:</a:t>
+              <a:t>Rede Neural Convolucional: </a:t>
             </a:r>
           </a:p>
           <a:p>
             <a:pPr lvl="1"/>
-            <a:r>
-              <a:rPr lang="pt-BR" dirty="0"/>
-              <a:t>Rede neural: </a:t>
-            </a:r>
-          </a:p>
-          <a:p>
-            <a:pPr lvl="2"/>
             <a:r>
               <a:rPr lang="pt-BR" dirty="0"/>
               <a:t>Conjunto de camadas interconectadas compostas por vários </a:t>
@@ -3556,10 +3553,16 @@
               <a:rPr lang="pt-BR" b="1" dirty="0"/>
               <a:t>neurônios artificiais</a:t>
             </a:r>
-            <a:endParaRPr lang="pt-BR" dirty="0"/>
-          </a:p>
-          <a:p>
-            <a:pPr lvl="2"/>
+          </a:p>
+          <a:p>
+            <a:pPr lvl="1"/>
+            <a:r>
+              <a:rPr lang="pt-BR" dirty="0"/>
+              <a:t>Possui camadas para realçar detalhes dos dados recebidos</a:t>
+            </a:r>
+          </a:p>
+          <a:p>
+            <a:pPr lvl="1"/>
             <a:r>
               <a:rPr lang="pt-BR" dirty="0"/>
               <a:t>Possibilitam o computador a </a:t>
@@ -3590,39 +3593,14 @@
             </a:r>
           </a:p>
           <a:p>
-            <a:pPr marL="914400" lvl="2" indent="0">
+            <a:pPr marL="457200" lvl="1" indent="0">
               <a:buNone/>
             </a:pPr>
-            <a:endParaRPr lang="pt-BR" sz="1000" dirty="0"/>
+            <a:endParaRPr lang="pt-BR" sz="1200" dirty="0"/>
           </a:p>
           <a:p>
             <a:pPr lvl="1"/>
-            <a:r>
-              <a:rPr lang="pt-BR" dirty="0"/>
-              <a:t>Além das camadas densas de neurônios, apresenta também:</a:t>
-            </a:r>
-          </a:p>
-          <a:p>
-            <a:pPr lvl="2"/>
-            <a:r>
-              <a:rPr lang="pt-BR" dirty="0"/>
-              <a:t>Camadas de convolução: realçar detalhes</a:t>
-            </a:r>
-          </a:p>
-          <a:p>
-            <a:pPr lvl="2"/>
-            <a:r>
-              <a:rPr lang="pt-BR" dirty="0"/>
-              <a:t>Camadas de </a:t>
-            </a:r>
-            <a:r>
-              <a:rPr lang="pt-BR" dirty="0" err="1"/>
-              <a:t>pooling</a:t>
-            </a:r>
-            <a:r>
-              <a:rPr lang="pt-BR" dirty="0"/>
-              <a:t>: reduzir imagem</a:t>
-            </a:r>
+            <a:endParaRPr lang="pt-BR" dirty="0"/>
           </a:p>
         </p:txBody>
       </p:sp>
@@ -3679,7 +3657,7 @@
           <a:p>
             <a:r>
               <a:rPr lang="pt-BR" dirty="0"/>
-              <a:t>Rede Neural Convolucional – exemplos</a:t>
+              <a:t>Sobre a rede desenvolvida - introdução</a:t>
             </a:r>
           </a:p>
         </p:txBody>
@@ -3707,31 +3685,90 @@
           </a:bodyPr>
           <a:lstStyle/>
           <a:p>
+            <a:pPr marL="0" indent="0">
+              <a:buNone/>
+            </a:pPr>
             <a:r>
               <a:rPr lang="pt-BR" dirty="0"/>
-              <a:t>Alguns exemplos bastante conhecidos:</a:t>
+              <a:t>Rede Neural Convolucional: </a:t>
             </a:r>
           </a:p>
           <a:p>
             <a:pPr lvl="1"/>
+            <a:r>
+              <a:rPr lang="pt-BR" dirty="0"/>
+              <a:t>Apresenta:</a:t>
+            </a:r>
+          </a:p>
+          <a:p>
+            <a:pPr lvl="2"/>
+            <a:r>
+              <a:rPr lang="pt-BR" b="1" dirty="0"/>
+              <a:t>Camadas de convolução: </a:t>
+            </a:r>
+            <a:r>
+              <a:rPr lang="pt-BR" dirty="0"/>
+              <a:t>realçar detalhes</a:t>
+            </a:r>
+          </a:p>
+          <a:p>
+            <a:pPr lvl="2"/>
+            <a:r>
+              <a:rPr lang="pt-BR" b="1" dirty="0"/>
+              <a:t>Camadas de </a:t>
+            </a:r>
+            <a:r>
+              <a:rPr lang="pt-BR" b="1" dirty="0" err="1"/>
+              <a:t>pooling</a:t>
+            </a:r>
+            <a:r>
+              <a:rPr lang="pt-BR" b="1" dirty="0"/>
+              <a:t>: </a:t>
+            </a:r>
+            <a:r>
+              <a:rPr lang="pt-BR" dirty="0"/>
+              <a:t>reduzir imagem</a:t>
+            </a:r>
+          </a:p>
+          <a:p>
+            <a:pPr lvl="2"/>
+            <a:r>
+              <a:rPr lang="pt-BR" b="1" dirty="0"/>
+              <a:t>Camadas densas de neurônios: </a:t>
+            </a:r>
+            <a:r>
+              <a:rPr lang="pt-BR" dirty="0"/>
+              <a:t>ajustam a rede de acordo com os dados</a:t>
+            </a:r>
+          </a:p>
+          <a:p>
+            <a:pPr lvl="2"/>
+            <a:endParaRPr lang="pt-BR" sz="1000" dirty="0"/>
+          </a:p>
+          <a:p>
+            <a:pPr lvl="1"/>
+            <a:r>
+              <a:rPr lang="pt-BR" dirty="0"/>
+              <a:t>Exemplos famosos:</a:t>
+            </a:r>
+          </a:p>
+          <a:p>
+            <a:pPr lvl="2"/>
             <a:r>
               <a:rPr lang="pt-BR" dirty="0"/>
               <a:t>LeNet-5</a:t>
             </a:r>
           </a:p>
           <a:p>
-            <a:pPr lvl="1"/>
+            <a:pPr lvl="2"/>
             <a:r>
               <a:rPr lang="pt-BR" dirty="0" err="1"/>
               <a:t>ResNet</a:t>
             </a:r>
-            <a:r>
-              <a:rPr lang="pt-BR" dirty="0"/>
-              <a:t>: </a:t>
-            </a:r>
-          </a:p>
-          <a:p>
-            <a:pPr lvl="1"/>
+            <a:endParaRPr lang="pt-BR" dirty="0"/>
+          </a:p>
+          <a:p>
+            <a:pPr lvl="2"/>
             <a:r>
               <a:rPr lang="pt-BR" dirty="0" err="1"/>
               <a:t>AlexNet</a:t>
@@ -3739,11 +3776,17 @@
             <a:endParaRPr lang="pt-BR" dirty="0"/>
           </a:p>
           <a:p>
-            <a:pPr lvl="1"/>
+            <a:pPr lvl="2"/>
             <a:r>
               <a:rPr lang="pt-BR" b="1" dirty="0"/>
               <a:t>VGG-16</a:t>
             </a:r>
+          </a:p>
+          <a:p>
+            <a:pPr marL="457200" lvl="1" indent="0">
+              <a:buNone/>
+            </a:pPr>
+            <a:endParaRPr lang="pt-BR" sz="1200" dirty="0"/>
           </a:p>
           <a:p>
             <a:pPr lvl="1"/>
@@ -3754,7 +3797,7 @@
     </p:spTree>
     <p:extLst>
       <p:ext uri="{BB962C8B-B14F-4D97-AF65-F5344CB8AC3E}">
-        <p14:creationId xmlns:p14="http://schemas.microsoft.com/office/powerpoint/2010/main" val="384792916"/>
+        <p14:creationId xmlns:p14="http://schemas.microsoft.com/office/powerpoint/2010/main" val="3594115775"/>
       </p:ext>
     </p:extLst>
   </p:cSld>
@@ -3804,7 +3847,7 @@
           <a:p>
             <a:r>
               <a:rPr lang="pt-BR" dirty="0"/>
-              <a:t>Arquitetura VGG-16</a:t>
+              <a:t>Rede VGG-16</a:t>
             </a:r>
           </a:p>
         </p:txBody>
@@ -3928,14 +3971,21 @@
             <p:ph type="title"/>
           </p:nvPr>
         </p:nvSpPr>
-        <p:spPr/>
+        <p:spPr>
+          <a:xfrm>
+            <a:off x="838200" y="365125"/>
+            <a:ext cx="10515600" cy="1325563"/>
+          </a:xfrm>
+        </p:spPr>
         <p:txBody>
-          <a:bodyPr/>
+          <a:bodyPr>
+            <a:normAutofit/>
+          </a:bodyPr>
           <a:lstStyle/>
           <a:p>
             <a:r>
-              <a:rPr lang="pt-BR" dirty="0"/>
-              <a:t>Melhorando desempenho</a:t>
+              <a:rPr lang="pt-BR" sz="3600" dirty="0"/>
+              <a:t>Sobre a rede desenvolvida – arquitetura simplificada</a:t>
             </a:r>
           </a:p>
         </p:txBody>
@@ -3958,12 +4008,24 @@
         </p:nvSpPr>
         <p:spPr/>
         <p:txBody>
-          <a:bodyPr/>
+          <a:bodyPr>
+            <a:normAutofit/>
+          </a:bodyPr>
           <a:lstStyle/>
           <a:p>
+            <a:pPr marL="0" indent="0">
+              <a:buNone/>
+            </a:pPr>
             <a:r>
               <a:rPr lang="pt-BR" dirty="0"/>
-              <a:t>Data </a:t>
+              <a:t>Camadas que compõem a rede:</a:t>
+            </a:r>
+          </a:p>
+          <a:p>
+            <a:pPr lvl="1"/>
+            <a:r>
+              <a:rPr lang="pt-BR" dirty="0"/>
+              <a:t>Camadas de pré processamento (data </a:t>
             </a:r>
             <a:r>
               <a:rPr lang="pt-BR" dirty="0" err="1"/>
@@ -3971,15 +4033,82 @@
             </a:r>
             <a:r>
               <a:rPr lang="pt-BR" dirty="0"/>
-              <a:t>: aplicar técnicas para aumentar o conjunto de dados sem colocar novas imagens</a:t>
-            </a:r>
+              <a:t>)</a:t>
+            </a:r>
+          </a:p>
+          <a:p>
+            <a:pPr lvl="1"/>
+            <a:r>
+              <a:rPr lang="pt-BR" dirty="0"/>
+              <a:t>Camadas da VGG pré treinadas (diversas camadas de convolução e </a:t>
+            </a:r>
+            <a:r>
+              <a:rPr lang="pt-BR" dirty="0" err="1"/>
+              <a:t>pooling</a:t>
+            </a:r>
+            <a:r>
+              <a:rPr lang="pt-BR" dirty="0"/>
+              <a:t> pré estruturadas e treinadas – </a:t>
+            </a:r>
+            <a:r>
+              <a:rPr lang="pt-BR" i="1" dirty="0" err="1"/>
+              <a:t>transfer</a:t>
+            </a:r>
+            <a:r>
+              <a:rPr lang="pt-BR" i="1" dirty="0"/>
+              <a:t> </a:t>
+            </a:r>
+            <a:r>
+              <a:rPr lang="pt-BR" i="1" dirty="0" err="1"/>
+              <a:t>learning</a:t>
+            </a:r>
+            <a:r>
+              <a:rPr lang="pt-BR" dirty="0"/>
+              <a:t>)</a:t>
+            </a:r>
+          </a:p>
+          <a:p>
+            <a:pPr lvl="1"/>
+            <a:r>
+              <a:rPr lang="pt-BR" dirty="0"/>
+              <a:t>Camada </a:t>
+            </a:r>
+            <a:r>
+              <a:rPr lang="pt-BR" dirty="0" err="1"/>
+              <a:t>Flatten</a:t>
+            </a:r>
+            <a:endParaRPr lang="pt-BR" dirty="0"/>
+          </a:p>
+          <a:p>
+            <a:pPr lvl="1"/>
+            <a:r>
+              <a:rPr lang="pt-BR" dirty="0"/>
+              <a:t>Camadas densas de neurônios</a:t>
+            </a:r>
+          </a:p>
+          <a:p>
+            <a:pPr lvl="1"/>
+            <a:r>
+              <a:rPr lang="pt-BR" dirty="0"/>
+              <a:t>Camada de saída</a:t>
+            </a:r>
+          </a:p>
+          <a:p>
+            <a:pPr marL="914400" lvl="2" indent="0">
+              <a:buNone/>
+            </a:pPr>
+            <a:endParaRPr lang="pt-BR" sz="1000" dirty="0"/>
+          </a:p>
+          <a:p>
+            <a:pPr lvl="1"/>
+            <a:endParaRPr lang="pt-BR" dirty="0"/>
           </a:p>
         </p:txBody>
       </p:sp>
     </p:spTree>
     <p:extLst>
       <p:ext uri="{BB962C8B-B14F-4D97-AF65-F5344CB8AC3E}">
-        <p14:creationId xmlns:p14="http://schemas.microsoft.com/office/powerpoint/2010/main" val="1170366322"/>
+        <p14:creationId xmlns:p14="http://schemas.microsoft.com/office/powerpoint/2010/main" val="522236478"/>
       </p:ext>
     </p:extLst>
   </p:cSld>
@@ -3990,6 +4119,97 @@
 </file>
 
 <file path=ppt/slides/slide14.xml><?xml version="1.0" encoding="utf-8"?>
+<p:sld xmlns:a="http://schemas.openxmlformats.org/drawingml/2006/main" xmlns:r="http://schemas.openxmlformats.org/officeDocument/2006/relationships" xmlns:p="http://schemas.openxmlformats.org/presentationml/2006/main">
+  <p:cSld>
+    <p:spTree>
+      <p:nvGrpSpPr>
+        <p:cNvPr id="1" name=""/>
+        <p:cNvGrpSpPr/>
+        <p:nvPr/>
+      </p:nvGrpSpPr>
+      <p:grpSpPr>
+        <a:xfrm>
+          <a:off x="0" y="0"/>
+          <a:ext cx="0" cy="0"/>
+          <a:chOff x="0" y="0"/>
+          <a:chExt cx="0" cy="0"/>
+        </a:xfrm>
+      </p:grpSpPr>
+      <p:sp>
+        <p:nvSpPr>
+          <p:cNvPr id="2" name="Título 1">
+            <a:extLst>
+              <a:ext uri="{FF2B5EF4-FFF2-40B4-BE49-F238E27FC236}">
+                <a16:creationId xmlns:a16="http://schemas.microsoft.com/office/drawing/2014/main" id="{7CF8DE70-FEF7-4357-BEF2-8B9F283BD640}"/>
+              </a:ext>
+            </a:extLst>
+          </p:cNvPr>
+          <p:cNvSpPr>
+            <a:spLocks noGrp="1"/>
+          </p:cNvSpPr>
+          <p:nvPr>
+            <p:ph type="title"/>
+          </p:nvPr>
+        </p:nvSpPr>
+        <p:spPr/>
+        <p:txBody>
+          <a:bodyPr>
+            <a:normAutofit/>
+          </a:bodyPr>
+          <a:lstStyle/>
+          <a:p>
+            <a:r>
+              <a:rPr lang="pt-BR" sz="3600" dirty="0"/>
+              <a:t>Sobre a rede desenvolvida – arquitetura final</a:t>
+            </a:r>
+          </a:p>
+        </p:txBody>
+      </p:sp>
+      <p:sp>
+        <p:nvSpPr>
+          <p:cNvPr id="3" name="Espaço Reservado para Conteúdo 2">
+            <a:extLst>
+              <a:ext uri="{FF2B5EF4-FFF2-40B4-BE49-F238E27FC236}">
+                <a16:creationId xmlns:a16="http://schemas.microsoft.com/office/drawing/2014/main" id="{480BDFB0-3F77-4040-B02F-48081BC0E520}"/>
+              </a:ext>
+            </a:extLst>
+          </p:cNvPr>
+          <p:cNvSpPr>
+            <a:spLocks noGrp="1"/>
+          </p:cNvSpPr>
+          <p:nvPr>
+            <p:ph idx="1"/>
+          </p:nvPr>
+        </p:nvSpPr>
+        <p:spPr/>
+        <p:txBody>
+          <a:bodyPr/>
+          <a:lstStyle/>
+          <a:p>
+            <a:r>
+              <a:rPr lang="pt-BR" dirty="0"/>
+              <a:t>Imagem</a:t>
+            </a:r>
+          </a:p>
+          <a:p>
+            <a:endParaRPr lang="pt-BR" dirty="0"/>
+          </a:p>
+        </p:txBody>
+      </p:sp>
+    </p:spTree>
+    <p:extLst>
+      <p:ext uri="{BB962C8B-B14F-4D97-AF65-F5344CB8AC3E}">
+        <p14:creationId xmlns:p14="http://schemas.microsoft.com/office/powerpoint/2010/main" val="4002728927"/>
+      </p:ext>
+    </p:extLst>
+  </p:cSld>
+  <p:clrMapOvr>
+    <a:masterClrMapping/>
+  </p:clrMapOvr>
+</p:sld>
+</file>
+
+<file path=ppt/slides/slide15.xml><?xml version="1.0" encoding="utf-8"?>
 <p:sld xmlns:a="http://schemas.openxmlformats.org/drawingml/2006/main" xmlns:r="http://schemas.openxmlformats.org/officeDocument/2006/relationships" xmlns:p="http://schemas.openxmlformats.org/presentationml/2006/main">
   <p:cSld>
     <p:spTree>
@@ -5387,7 +5607,7 @@
 </p:sld>
 </file>
 
-<file path=ppt/slides/slide15.xml><?xml version="1.0" encoding="utf-8"?>
+<file path=ppt/slides/slide16.xml><?xml version="1.0" encoding="utf-8"?>
 <p:sld xmlns:a="http://schemas.openxmlformats.org/drawingml/2006/main" xmlns:r="http://schemas.openxmlformats.org/officeDocument/2006/relationships" xmlns:p="http://schemas.openxmlformats.org/presentationml/2006/main">
   <p:cSld>
     <p:spTree>
@@ -5445,7 +5665,7 @@
 </p:sld>
 </file>
 
-<file path=ppt/slides/slide16.xml><?xml version="1.0" encoding="utf-8"?>
+<file path=ppt/slides/slide17.xml><?xml version="1.0" encoding="utf-8"?>
 <p:sld xmlns:a="http://schemas.openxmlformats.org/drawingml/2006/main" xmlns:r="http://schemas.openxmlformats.org/officeDocument/2006/relationships" xmlns:p="http://schemas.openxmlformats.org/presentationml/2006/main">
   <p:cSld>
     <p:spTree>
@@ -6652,7 +6872,7 @@
 </p:sld>
 </file>
 
-<file path=ppt/slides/slide17.xml><?xml version="1.0" encoding="utf-8"?>
+<file path=ppt/slides/slide18.xml><?xml version="1.0" encoding="utf-8"?>
 <p:sld xmlns:a="http://schemas.openxmlformats.org/drawingml/2006/main" xmlns:r="http://schemas.openxmlformats.org/officeDocument/2006/relationships" xmlns:p="http://schemas.openxmlformats.org/presentationml/2006/main">
   <p:cSld>
     <p:spTree>
@@ -6990,7 +7210,7 @@
             </a:r>
             <a:r>
               <a:rPr lang="pt-BR" dirty="0"/>
-              <a:t>recebe imagens de radiografia sobre um indivíduo e o classifica como possível vítima ou não</a:t>
+              <a:t>recebe imagens de tomografia sobre o cérebro de um indivíduo e o classifica como possível vítima ou não</a:t>
             </a:r>
           </a:p>
         </p:txBody>

</xml_diff>